<commit_message>
change docs and presentation
</commit_message>
<xml_diff>
--- a/FSRtchkov_EmotionClassificationPresentation.pptx
+++ b/FSRtchkov_EmotionClassificationPresentation.pptx
@@ -306,7 +306,7 @@
           <a:p>
             <a:fld id="{B8DC8FB1-998C-4701-8716-00A9C1367F8B}" type="datetimeFigureOut">
               <a:rPr lang="ru-RU" smtClean="0"/>
-              <a:t>20.09.2017</a:t>
+              <a:t>21.09.2017</a:t>
             </a:fld>
             <a:endParaRPr lang="ru-RU"/>
           </a:p>
@@ -476,7 +476,7 @@
           <a:p>
             <a:fld id="{B8DC8FB1-998C-4701-8716-00A9C1367F8B}" type="datetimeFigureOut">
               <a:rPr lang="ru-RU" smtClean="0"/>
-              <a:t>20.09.2017</a:t>
+              <a:t>21.09.2017</a:t>
             </a:fld>
             <a:endParaRPr lang="ru-RU"/>
           </a:p>
@@ -656,7 +656,7 @@
           <a:p>
             <a:fld id="{B8DC8FB1-998C-4701-8716-00A9C1367F8B}" type="datetimeFigureOut">
               <a:rPr lang="ru-RU" smtClean="0"/>
-              <a:t>20.09.2017</a:t>
+              <a:t>21.09.2017</a:t>
             </a:fld>
             <a:endParaRPr lang="ru-RU"/>
           </a:p>
@@ -826,7 +826,7 @@
           <a:p>
             <a:fld id="{B8DC8FB1-998C-4701-8716-00A9C1367F8B}" type="datetimeFigureOut">
               <a:rPr lang="ru-RU" smtClean="0"/>
-              <a:t>20.09.2017</a:t>
+              <a:t>21.09.2017</a:t>
             </a:fld>
             <a:endParaRPr lang="ru-RU"/>
           </a:p>
@@ -1072,7 +1072,7 @@
           <a:p>
             <a:fld id="{B8DC8FB1-998C-4701-8716-00A9C1367F8B}" type="datetimeFigureOut">
               <a:rPr lang="ru-RU" smtClean="0"/>
-              <a:t>20.09.2017</a:t>
+              <a:t>21.09.2017</a:t>
             </a:fld>
             <a:endParaRPr lang="ru-RU"/>
           </a:p>
@@ -1360,7 +1360,7 @@
           <a:p>
             <a:fld id="{B8DC8FB1-998C-4701-8716-00A9C1367F8B}" type="datetimeFigureOut">
               <a:rPr lang="ru-RU" smtClean="0"/>
-              <a:t>20.09.2017</a:t>
+              <a:t>21.09.2017</a:t>
             </a:fld>
             <a:endParaRPr lang="ru-RU"/>
           </a:p>
@@ -1782,7 +1782,7 @@
           <a:p>
             <a:fld id="{B8DC8FB1-998C-4701-8716-00A9C1367F8B}" type="datetimeFigureOut">
               <a:rPr lang="ru-RU" smtClean="0"/>
-              <a:t>20.09.2017</a:t>
+              <a:t>21.09.2017</a:t>
             </a:fld>
             <a:endParaRPr lang="ru-RU"/>
           </a:p>
@@ -1900,7 +1900,7 @@
           <a:p>
             <a:fld id="{B8DC8FB1-998C-4701-8716-00A9C1367F8B}" type="datetimeFigureOut">
               <a:rPr lang="ru-RU" smtClean="0"/>
-              <a:t>20.09.2017</a:t>
+              <a:t>21.09.2017</a:t>
             </a:fld>
             <a:endParaRPr lang="ru-RU"/>
           </a:p>
@@ -1995,7 +1995,7 @@
           <a:p>
             <a:fld id="{B8DC8FB1-998C-4701-8716-00A9C1367F8B}" type="datetimeFigureOut">
               <a:rPr lang="ru-RU" smtClean="0"/>
-              <a:t>20.09.2017</a:t>
+              <a:t>21.09.2017</a:t>
             </a:fld>
             <a:endParaRPr lang="ru-RU"/>
           </a:p>
@@ -2272,7 +2272,7 @@
           <a:p>
             <a:fld id="{B8DC8FB1-998C-4701-8716-00A9C1367F8B}" type="datetimeFigureOut">
               <a:rPr lang="ru-RU" smtClean="0"/>
-              <a:t>20.09.2017</a:t>
+              <a:t>21.09.2017</a:t>
             </a:fld>
             <a:endParaRPr lang="ru-RU"/>
           </a:p>
@@ -2525,7 +2525,7 @@
           <a:p>
             <a:fld id="{B8DC8FB1-998C-4701-8716-00A9C1367F8B}" type="datetimeFigureOut">
               <a:rPr lang="ru-RU" smtClean="0"/>
-              <a:t>20.09.2017</a:t>
+              <a:t>21.09.2017</a:t>
             </a:fld>
             <a:endParaRPr lang="ru-RU"/>
           </a:p>
@@ -2738,7 +2738,7 @@
           <a:p>
             <a:fld id="{B8DC8FB1-998C-4701-8716-00A9C1367F8B}" type="datetimeFigureOut">
               <a:rPr lang="ru-RU" smtClean="0"/>
-              <a:t>20.09.2017</a:t>
+              <a:t>21.09.2017</a:t>
             </a:fld>
             <a:endParaRPr lang="ru-RU"/>
           </a:p>
@@ -3125,14 +3125,16 @@
         </p:nvSpPr>
         <p:spPr/>
         <p:txBody>
-          <a:bodyPr/>
-          <a:lstStyle/>
-          <a:p>
-            <a:r>
-              <a:rPr lang="ru-RU" dirty="0" smtClean="0"/>
-              <a:t>Определение эмоции человека по фотографии</a:t>
-            </a:r>
-            <a:endParaRPr lang="ru-RU" dirty="0"/>
+          <a:bodyPr>
+            <a:normAutofit/>
+          </a:bodyPr>
+          <a:lstStyle/>
+          <a:p>
+            <a:r>
+              <a:rPr lang="ru-RU" sz="3200" dirty="0" smtClean="0"/>
+              <a:t>Разработка программного комплекса по определению эмоций человека</a:t>
+            </a:r>
+            <a:endParaRPr lang="ru-RU" sz="3200" dirty="0"/>
           </a:p>
         </p:txBody>
       </p:sp>
@@ -5123,7 +5125,6 @@
               <a:rPr lang="en-US" altLang="en-US" sz="2800" dirty="0" smtClean="0"/>
               <a:t> 3.1.</a:t>
             </a:r>
-            <a:endParaRPr lang="en-US" altLang="en-US" sz="2800" dirty="0" smtClean="0"/>
           </a:p>
           <a:p>
             <a:pPr marL="0" indent="0">
@@ -5197,11 +5198,7 @@
             </a:r>
             <a:r>
               <a:rPr lang="ru-RU" altLang="en-US" sz="2600" dirty="0" smtClean="0"/>
-              <a:t>12</a:t>
-            </a:r>
-            <a:r>
-              <a:rPr lang="ru-RU" altLang="en-US" sz="2600" dirty="0" smtClean="0"/>
-              <a:t>гб</a:t>
+              <a:t>12гб</a:t>
             </a:r>
           </a:p>
           <a:p>
@@ -5918,7 +5915,6 @@
               <a:rPr lang="ru-RU" dirty="0" smtClean="0"/>
               <a:t>Метод собственных лиц</a:t>
             </a:r>
-            <a:endParaRPr lang="ru-RU" dirty="0" smtClean="0"/>
           </a:p>
           <a:p>
             <a:r>

</xml_diff>